<commit_message>
pad and depad added
</commit_message>
<xml_diff>
--- a/EC504Project2.pptx
+++ b/EC504Project2.pptx
@@ -8,8 +8,10 @@
     <p:sldId id="256" r:id="rId2"/>
     <p:sldId id="257" r:id="rId3"/>
     <p:sldId id="258" r:id="rId4"/>
-    <p:sldId id="259" r:id="rId5"/>
-    <p:sldId id="260" r:id="rId6"/>
+    <p:sldId id="262" r:id="rId5"/>
+    <p:sldId id="261" r:id="rId6"/>
+    <p:sldId id="259" r:id="rId7"/>
+    <p:sldId id="260" r:id="rId8"/>
   </p:sldIdLst>
   <p:sldSz cx="12192000" cy="6858000"/>
   <p:notesSz cx="6858000" cy="9144000"/>
@@ -286,7 +288,7 @@
           <a:p>
             <a:fld id="{48A87A34-81AB-432B-8DAE-1953F412C126}" type="datetimeFigureOut">
               <a:rPr lang="en-US" dirty="0"/>
-              <a:t>12/7/2020</a:t>
+              <a:t>12/8/2020</a:t>
             </a:fld>
             <a:endParaRPr lang="en-US" dirty="0"/>
           </a:p>
@@ -548,7 +550,7 @@
           <a:p>
             <a:fld id="{48A87A34-81AB-432B-8DAE-1953F412C126}" type="datetimeFigureOut">
               <a:rPr lang="en-US" dirty="0"/>
-              <a:t>12/7/2020</a:t>
+              <a:t>12/8/2020</a:t>
             </a:fld>
             <a:endParaRPr lang="en-US" dirty="0"/>
           </a:p>
@@ -775,7 +777,7 @@
             <a:fld id="{48A87A34-81AB-432B-8DAE-1953F412C126}" type="datetimeFigureOut">
               <a:rPr lang="en-US" dirty="0"/>
               <a:pPr/>
-              <a:t>12/7/2020</a:t>
+              <a:t>12/8/2020</a:t>
             </a:fld>
             <a:endParaRPr lang="en-US" dirty="0"/>
           </a:p>
@@ -1081,7 +1083,7 @@
             <a:fld id="{48A87A34-81AB-432B-8DAE-1953F412C126}" type="datetimeFigureOut">
               <a:rPr lang="en-US" dirty="0"/>
               <a:pPr/>
-              <a:t>12/7/2020</a:t>
+              <a:t>12/8/2020</a:t>
             </a:fld>
             <a:endParaRPr lang="en-US" dirty="0"/>
           </a:p>
@@ -1550,7 +1552,7 @@
             <a:fld id="{48A87A34-81AB-432B-8DAE-1953F412C126}" type="datetimeFigureOut">
               <a:rPr lang="en-US" dirty="0"/>
               <a:pPr/>
-              <a:t>12/7/2020</a:t>
+              <a:t>12/8/2020</a:t>
             </a:fld>
             <a:endParaRPr lang="en-US" dirty="0"/>
           </a:p>
@@ -2092,7 +2094,7 @@
           <a:p>
             <a:fld id="{48A87A34-81AB-432B-8DAE-1953F412C126}" type="datetimeFigureOut">
               <a:rPr lang="en-US" dirty="0"/>
-              <a:t>12/7/2020</a:t>
+              <a:t>12/8/2020</a:t>
             </a:fld>
             <a:endParaRPr lang="en-US" dirty="0"/>
           </a:p>
@@ -2861,7 +2863,7 @@
           <a:p>
             <a:fld id="{48A87A34-81AB-432B-8DAE-1953F412C126}" type="datetimeFigureOut">
               <a:rPr lang="en-US" dirty="0"/>
-              <a:t>12/7/2020</a:t>
+              <a:t>12/8/2020</a:t>
             </a:fld>
             <a:endParaRPr lang="en-US" dirty="0"/>
           </a:p>
@@ -3031,7 +3033,7 @@
           <a:p>
             <a:fld id="{48A87A34-81AB-432B-8DAE-1953F412C126}" type="datetimeFigureOut">
               <a:rPr lang="en-US" dirty="0"/>
-              <a:t>12/7/2020</a:t>
+              <a:t>12/8/2020</a:t>
             </a:fld>
             <a:endParaRPr lang="en-US" dirty="0"/>
           </a:p>
@@ -3250,7 +3252,7 @@
             <a:fld id="{48A87A34-81AB-432B-8DAE-1953F412C126}" type="datetimeFigureOut">
               <a:rPr lang="en-US" dirty="0"/>
               <a:pPr/>
-              <a:t>12/7/2020</a:t>
+              <a:t>12/8/2020</a:t>
             </a:fld>
             <a:endParaRPr lang="en-US" dirty="0"/>
           </a:p>
@@ -3425,7 +3427,7 @@
           <a:p>
             <a:fld id="{48A87A34-81AB-432B-8DAE-1953F412C126}" type="datetimeFigureOut">
               <a:rPr lang="en-US" dirty="0"/>
-              <a:t>12/7/2020</a:t>
+              <a:t>12/8/2020</a:t>
             </a:fld>
             <a:endParaRPr lang="en-US" dirty="0"/>
           </a:p>
@@ -3710,7 +3712,7 @@
             <a:fld id="{48A87A34-81AB-432B-8DAE-1953F412C126}" type="datetimeFigureOut">
               <a:rPr lang="en-US" dirty="0"/>
               <a:pPr/>
-              <a:t>12/7/2020</a:t>
+              <a:t>12/8/2020</a:t>
             </a:fld>
             <a:endParaRPr lang="en-US" dirty="0"/>
           </a:p>
@@ -3947,7 +3949,7 @@
           <a:p>
             <a:fld id="{48A87A34-81AB-432B-8DAE-1953F412C126}" type="datetimeFigureOut">
               <a:rPr lang="en-US" dirty="0"/>
-              <a:t>12/7/2020</a:t>
+              <a:t>12/8/2020</a:t>
             </a:fld>
             <a:endParaRPr lang="en-US" dirty="0"/>
           </a:p>
@@ -4321,7 +4323,7 @@
           <a:p>
             <a:fld id="{48A87A34-81AB-432B-8DAE-1953F412C126}" type="datetimeFigureOut">
               <a:rPr lang="en-US" dirty="0"/>
-              <a:t>12/7/2020</a:t>
+              <a:t>12/8/2020</a:t>
             </a:fld>
             <a:endParaRPr lang="en-US" dirty="0"/>
           </a:p>
@@ -4434,7 +4436,7 @@
           <a:p>
             <a:fld id="{48A87A34-81AB-432B-8DAE-1953F412C126}" type="datetimeFigureOut">
               <a:rPr lang="en-US" dirty="0"/>
-              <a:t>12/7/2020</a:t>
+              <a:t>12/8/2020</a:t>
             </a:fld>
             <a:endParaRPr lang="en-US" dirty="0"/>
           </a:p>
@@ -4524,7 +4526,7 @@
           <a:p>
             <a:fld id="{48A87A34-81AB-432B-8DAE-1953F412C126}" type="datetimeFigureOut">
               <a:rPr lang="en-US" dirty="0"/>
-              <a:t>12/7/2020</a:t>
+              <a:t>12/8/2020</a:t>
             </a:fld>
             <a:endParaRPr lang="en-US" dirty="0"/>
           </a:p>
@@ -4768,7 +4770,7 @@
           <a:p>
             <a:fld id="{48A87A34-81AB-432B-8DAE-1953F412C126}" type="datetimeFigureOut">
               <a:rPr lang="en-US" dirty="0"/>
-              <a:t>12/7/2020</a:t>
+              <a:t>12/8/2020</a:t>
             </a:fld>
             <a:endParaRPr lang="en-US" dirty="0"/>
           </a:p>
@@ -5020,7 +5022,7 @@
           <a:p>
             <a:fld id="{48A87A34-81AB-432B-8DAE-1953F412C126}" type="datetimeFigureOut">
               <a:rPr lang="en-US" dirty="0"/>
-              <a:t>12/7/2020</a:t>
+              <a:t>12/8/2020</a:t>
             </a:fld>
             <a:endParaRPr lang="en-US" dirty="0"/>
           </a:p>
@@ -5259,7 +5261,7 @@
             <a:fld id="{48A87A34-81AB-432B-8DAE-1953F412C126}" type="datetimeFigureOut">
               <a:rPr lang="en-US" dirty="0"/>
               <a:pPr/>
-              <a:t>12/7/2020</a:t>
+              <a:t>12/8/2020</a:t>
             </a:fld>
             <a:endParaRPr lang="en-US" dirty="0"/>
           </a:p>
@@ -6232,13 +6234,13 @@
         </p:nvSpPr>
         <p:spPr>
           <a:xfrm>
-            <a:off x="685800" y="484094"/>
-            <a:ext cx="10820400" cy="6060141"/>
+            <a:off x="685800" y="484095"/>
+            <a:ext cx="10820400" cy="5782482"/>
           </a:xfrm>
         </p:spPr>
         <p:txBody>
           <a:bodyPr>
-            <a:normAutofit/>
+            <a:normAutofit lnSpcReduction="10000"/>
           </a:bodyPr>
           <a:lstStyle/>
           <a:p>
@@ -6256,7 +6258,7 @@
                 <a:latin typeface="Calibri" panose="020F0502020204030204" pitchFamily="34" charset="0"/>
                 <a:cs typeface="Calibri" panose="020F0502020204030204" pitchFamily="34" charset="0"/>
               </a:rPr>
-              <a:t>File Loading</a:t>
+              <a:t>File Padding</a:t>
             </a:r>
           </a:p>
           <a:p>
@@ -6266,7 +6268,7 @@
                 <a:latin typeface="Calibri" panose="020F0502020204030204" pitchFamily="34" charset="0"/>
                 <a:cs typeface="Calibri" panose="020F0502020204030204" pitchFamily="34" charset="0"/>
               </a:rPr>
-              <a:t>Generate a new filename structure, initialize name and insert into filename dictionary.</a:t>
+              <a:t>If we detect there is a file need to pad, we put the text name into function pad(char* c). In this function, we firstly detect the whole text and judge the length of this file. </a:t>
             </a:r>
           </a:p>
           <a:p>
@@ -6276,7 +6278,7 @@
                 <a:latin typeface="Calibri" panose="020F0502020204030204" pitchFamily="34" charset="0"/>
                 <a:cs typeface="Calibri" panose="020F0502020204030204" pitchFamily="34" charset="0"/>
               </a:rPr>
-              <a:t>Splitting file into chunks.</a:t>
+              <a:t>If the length is equal to our set size, return back. Otherwise, we need to detect the last character of this file. </a:t>
             </a:r>
           </a:p>
           <a:p>
@@ -6286,92 +6288,53 @@
                 <a:latin typeface="Calibri" panose="020F0502020204030204" pitchFamily="34" charset="0"/>
                 <a:cs typeface="Calibri" panose="020F0502020204030204" pitchFamily="34" charset="0"/>
               </a:rPr>
-              <a:t>For each chunk, do a SHA256 hash and search for same entry in </a:t>
-            </a:r>
-            <a:r>
-              <a:rPr lang="en-US" sz="2400" dirty="0" err="1">
-                <a:latin typeface="Calibri" panose="020F0502020204030204" pitchFamily="34" charset="0"/>
-                <a:cs typeface="Calibri" panose="020F0502020204030204" pitchFamily="34" charset="0"/>
-              </a:rPr>
-              <a:t>chunkname</a:t>
-            </a:r>
-            <a:r>
-              <a:rPr lang="en-US" sz="2400" dirty="0">
-                <a:latin typeface="Calibri" panose="020F0502020204030204" pitchFamily="34" charset="0"/>
-                <a:cs typeface="Calibri" panose="020F0502020204030204" pitchFamily="34" charset="0"/>
-              </a:rPr>
-              <a:t> dictionary. If found, simply add its </a:t>
-            </a:r>
-            <a:r>
-              <a:rPr lang="en-US" sz="2400" dirty="0" err="1">
-                <a:latin typeface="Calibri" panose="020F0502020204030204" pitchFamily="34" charset="0"/>
-                <a:cs typeface="Calibri" panose="020F0502020204030204" pitchFamily="34" charset="0"/>
-              </a:rPr>
-              <a:t>ownercount</a:t>
-            </a:r>
-            <a:r>
-              <a:rPr lang="en-US" sz="2400" dirty="0">
-                <a:latin typeface="Calibri" panose="020F0502020204030204" pitchFamily="34" charset="0"/>
-                <a:cs typeface="Calibri" panose="020F0502020204030204" pitchFamily="34" charset="0"/>
-              </a:rPr>
-              <a:t> by 1; else, save the actual data segment using the hash as name. A new Chunk structure is also built w/ </a:t>
-            </a:r>
-            <a:r>
-              <a:rPr lang="en-US" sz="2400" dirty="0" err="1">
-                <a:latin typeface="Calibri" panose="020F0502020204030204" pitchFamily="34" charset="0"/>
-                <a:cs typeface="Calibri" panose="020F0502020204030204" pitchFamily="34" charset="0"/>
-              </a:rPr>
-              <a:t>chunkname</a:t>
-            </a:r>
-            <a:r>
-              <a:rPr lang="en-US" sz="2400" dirty="0">
-                <a:latin typeface="Calibri" panose="020F0502020204030204" pitchFamily="34" charset="0"/>
-                <a:cs typeface="Calibri" panose="020F0502020204030204" pitchFamily="34" charset="0"/>
-              </a:rPr>
-              <a:t> and link the previous one to the current Chunk.</a:t>
+              <a:t>If the last one is the same as our first-order padding-label, we will choose the second-order label instead. Otherwise, we will use the first one and plus multiple labels after the original last character until the size of file can equal to our set size.</a:t>
             </a:r>
           </a:p>
           <a:p>
             <a:pPr lvl="1"/>
-            <a:r>
-              <a:rPr lang="en-US" sz="2400" dirty="0">
-                <a:latin typeface="Calibri" panose="020F0502020204030204" pitchFamily="34" charset="0"/>
-                <a:cs typeface="Calibri" panose="020F0502020204030204" pitchFamily="34" charset="0"/>
-              </a:rPr>
-              <a:t>Judge if the last segment need padding and pad it and set </a:t>
-            </a:r>
-            <a:r>
-              <a:rPr lang="en-US" sz="2400" i="1" dirty="0">
-                <a:latin typeface="Calibri" panose="020F0502020204030204" pitchFamily="34" charset="0"/>
-                <a:cs typeface="Calibri" panose="020F0502020204030204" pitchFamily="34" charset="0"/>
-              </a:rPr>
-              <a:t>padded</a:t>
-            </a:r>
-            <a:r>
-              <a:rPr lang="en-US" sz="2400" dirty="0">
-                <a:latin typeface="Calibri" panose="020F0502020204030204" pitchFamily="34" charset="0"/>
-                <a:cs typeface="Calibri" panose="020F0502020204030204" pitchFamily="34" charset="0"/>
-              </a:rPr>
-              <a:t>=1 if true. Then hash and build Chunk same as above.</a:t>
-            </a:r>
-          </a:p>
-          <a:p>
-            <a:r>
-              <a:rPr lang="en-US" sz="2800" dirty="0">
-                <a:latin typeface="Calibri" panose="020F0502020204030204" pitchFamily="34" charset="0"/>
-                <a:cs typeface="Calibri" panose="020F0502020204030204" pitchFamily="34" charset="0"/>
-              </a:rPr>
-              <a:t>File Listing</a:t>
-            </a:r>
+            <a:endParaRPr lang="en-US" sz="2400" dirty="0">
+              <a:latin typeface="Calibri" panose="020F0502020204030204" pitchFamily="34" charset="0"/>
+              <a:cs typeface="Calibri" panose="020F0502020204030204" pitchFamily="34" charset="0"/>
+            </a:endParaRPr>
           </a:p>
           <a:p>
             <a:pPr lvl="1"/>
             <a:r>
-              <a:rPr lang="en-US" sz="2400" dirty="0">
-                <a:latin typeface="Calibri" panose="020F0502020204030204" pitchFamily="34" charset="0"/>
-                <a:cs typeface="Calibri" panose="020F0502020204030204" pitchFamily="34" charset="0"/>
-              </a:rPr>
-              <a:t>Just list the dictionary of filenames. Supports alphabetical order; with extra timestamp/file size it is possible to have these orders as well.</a:t>
+              <a:rPr lang="en-US" altLang="zh-CN" sz="2400" dirty="0">
+                <a:solidFill>
+                  <a:srgbClr val="00B0F0"/>
+                </a:solidFill>
+                <a:latin typeface="Calibri" panose="020F0502020204030204" pitchFamily="34" charset="0"/>
+                <a:cs typeface="Calibri" panose="020F0502020204030204" pitchFamily="34" charset="0"/>
+              </a:rPr>
+              <a:t>For example, assume we need to pad the following text. We choose {0,1} as the added label.</a:t>
+            </a:r>
+          </a:p>
+          <a:p>
+            <a:pPr lvl="1"/>
+            <a:r>
+              <a:rPr lang="en-US" altLang="zh-CN" sz="2400" dirty="0">
+                <a:solidFill>
+                  <a:srgbClr val="FFFF00"/>
+                </a:solidFill>
+                <a:latin typeface="Calibri" panose="020F0502020204030204" pitchFamily="34" charset="0"/>
+                <a:cs typeface="Calibri" panose="020F0502020204030204" pitchFamily="34" charset="0"/>
+              </a:rPr>
+              <a:t>Before pad: The number of students in BU is more than 10000</a:t>
+            </a:r>
+          </a:p>
+          <a:p>
+            <a:pPr lvl="1"/>
+            <a:r>
+              <a:rPr lang="en-US" altLang="zh-CN" sz="2400" dirty="0">
+                <a:solidFill>
+                  <a:srgbClr val="FFFF00"/>
+                </a:solidFill>
+                <a:latin typeface="Calibri" panose="020F0502020204030204" pitchFamily="34" charset="0"/>
+                <a:cs typeface="Calibri" panose="020F0502020204030204" pitchFamily="34" charset="0"/>
+              </a:rPr>
+              <a:t>After pad: The number of students in BU is more than 1000011111111</a:t>
             </a:r>
           </a:p>
         </p:txBody>
@@ -6424,6 +6387,487 @@
         </p:nvSpPr>
         <p:spPr>
           <a:xfrm>
+            <a:off x="685800" y="484094"/>
+            <a:ext cx="10820400" cy="6060141"/>
+          </a:xfrm>
+        </p:spPr>
+        <p:txBody>
+          <a:bodyPr>
+            <a:normAutofit/>
+          </a:bodyPr>
+          <a:lstStyle/>
+          <a:p>
+            <a:r>
+              <a:rPr lang="en-US" sz="3600" dirty="0">
+                <a:latin typeface="Calibri" panose="020F0502020204030204" pitchFamily="34" charset="0"/>
+                <a:cs typeface="Calibri" panose="020F0502020204030204" pitchFamily="34" charset="0"/>
+              </a:rPr>
+              <a:t>Function Outlines</a:t>
+            </a:r>
+          </a:p>
+          <a:p>
+            <a:r>
+              <a:rPr lang="en-US" sz="2800" dirty="0">
+                <a:latin typeface="Calibri" panose="020F0502020204030204" pitchFamily="34" charset="0"/>
+                <a:cs typeface="Calibri" panose="020F0502020204030204" pitchFamily="34" charset="0"/>
+              </a:rPr>
+              <a:t>File </a:t>
+            </a:r>
+            <a:r>
+              <a:rPr lang="en-US" sz="2800" dirty="0" err="1">
+                <a:latin typeface="Calibri" panose="020F0502020204030204" pitchFamily="34" charset="0"/>
+                <a:cs typeface="Calibri" panose="020F0502020204030204" pitchFamily="34" charset="0"/>
+              </a:rPr>
+              <a:t>Depadding</a:t>
+            </a:r>
+            <a:endParaRPr lang="en-US" sz="2800" dirty="0">
+              <a:latin typeface="Calibri" panose="020F0502020204030204" pitchFamily="34" charset="0"/>
+              <a:cs typeface="Calibri" panose="020F0502020204030204" pitchFamily="34" charset="0"/>
+            </a:endParaRPr>
+          </a:p>
+          <a:p>
+            <a:pPr lvl="1"/>
+            <a:r>
+              <a:rPr lang="en-US" sz="2400" dirty="0">
+                <a:latin typeface="Calibri" panose="020F0502020204030204" pitchFamily="34" charset="0"/>
+                <a:cs typeface="Calibri" panose="020F0502020204030204" pitchFamily="34" charset="0"/>
+              </a:rPr>
+              <a:t>If we detect there is a file need to </a:t>
+            </a:r>
+            <a:r>
+              <a:rPr lang="en-US" sz="2400" dirty="0" err="1">
+                <a:latin typeface="Calibri" panose="020F0502020204030204" pitchFamily="34" charset="0"/>
+                <a:cs typeface="Calibri" panose="020F0502020204030204" pitchFamily="34" charset="0"/>
+              </a:rPr>
+              <a:t>depad</a:t>
+            </a:r>
+            <a:r>
+              <a:rPr lang="en-US" sz="2400" dirty="0">
+                <a:latin typeface="Calibri" panose="020F0502020204030204" pitchFamily="34" charset="0"/>
+                <a:cs typeface="Calibri" panose="020F0502020204030204" pitchFamily="34" charset="0"/>
+              </a:rPr>
+              <a:t>, we put the text name into function </a:t>
+            </a:r>
+            <a:r>
+              <a:rPr lang="en-US" sz="2400" dirty="0" err="1">
+                <a:latin typeface="Calibri" panose="020F0502020204030204" pitchFamily="34" charset="0"/>
+                <a:cs typeface="Calibri" panose="020F0502020204030204" pitchFamily="34" charset="0"/>
+              </a:rPr>
+              <a:t>depad</a:t>
+            </a:r>
+            <a:r>
+              <a:rPr lang="en-US" sz="2400" dirty="0">
+                <a:latin typeface="Calibri" panose="020F0502020204030204" pitchFamily="34" charset="0"/>
+                <a:cs typeface="Calibri" panose="020F0502020204030204" pitchFamily="34" charset="0"/>
+              </a:rPr>
+              <a:t>(char* c). In this function, we will delete the added labels in the file rail.</a:t>
+            </a:r>
+          </a:p>
+          <a:p>
+            <a:pPr lvl="1"/>
+            <a:r>
+              <a:rPr lang="en-US" sz="2400" dirty="0">
+                <a:latin typeface="Calibri" panose="020F0502020204030204" pitchFamily="34" charset="0"/>
+                <a:cs typeface="Calibri" panose="020F0502020204030204" pitchFamily="34" charset="0"/>
+              </a:rPr>
+              <a:t>At first, we need to judge if the last one is the same as our first-order padding-label, we will choose the second-order label instead. </a:t>
+            </a:r>
+          </a:p>
+          <a:p>
+            <a:pPr lvl="1"/>
+            <a:r>
+              <a:rPr lang="en-US" sz="2400" dirty="0">
+                <a:latin typeface="Calibri" panose="020F0502020204030204" pitchFamily="34" charset="0"/>
+                <a:cs typeface="Calibri" panose="020F0502020204030204" pitchFamily="34" charset="0"/>
+              </a:rPr>
+              <a:t>After we know which label we used here, we can delete the rail labels until we detect the first no-chosen character.</a:t>
+            </a:r>
+          </a:p>
+          <a:p>
+            <a:pPr lvl="1"/>
+            <a:endParaRPr lang="en-US" sz="2400" dirty="0">
+              <a:latin typeface="Calibri" panose="020F0502020204030204" pitchFamily="34" charset="0"/>
+              <a:cs typeface="Calibri" panose="020F0502020204030204" pitchFamily="34" charset="0"/>
+            </a:endParaRPr>
+          </a:p>
+          <a:p>
+            <a:pPr lvl="1"/>
+            <a:r>
+              <a:rPr lang="en-US" sz="2400" dirty="0">
+                <a:solidFill>
+                  <a:srgbClr val="00B0F0"/>
+                </a:solidFill>
+                <a:latin typeface="Calibri" panose="020F0502020204030204" pitchFamily="34" charset="0"/>
+                <a:cs typeface="Calibri" panose="020F0502020204030204" pitchFamily="34" charset="0"/>
+              </a:rPr>
+              <a:t>For example, assume we need to </a:t>
+            </a:r>
+            <a:r>
+              <a:rPr lang="en-US" sz="2400" dirty="0" err="1">
+                <a:solidFill>
+                  <a:srgbClr val="00B0F0"/>
+                </a:solidFill>
+                <a:latin typeface="Calibri" panose="020F0502020204030204" pitchFamily="34" charset="0"/>
+                <a:cs typeface="Calibri" panose="020F0502020204030204" pitchFamily="34" charset="0"/>
+              </a:rPr>
+              <a:t>depad</a:t>
+            </a:r>
+            <a:r>
+              <a:rPr lang="en-US" sz="2400" dirty="0">
+                <a:solidFill>
+                  <a:srgbClr val="00B0F0"/>
+                </a:solidFill>
+                <a:latin typeface="Calibri" panose="020F0502020204030204" pitchFamily="34" charset="0"/>
+                <a:cs typeface="Calibri" panose="020F0502020204030204" pitchFamily="34" charset="0"/>
+              </a:rPr>
+              <a:t> the following text. We </a:t>
+            </a:r>
+            <a:r>
+              <a:rPr lang="en-US" sz="2400">
+                <a:solidFill>
+                  <a:srgbClr val="00B0F0"/>
+                </a:solidFill>
+                <a:latin typeface="Calibri" panose="020F0502020204030204" pitchFamily="34" charset="0"/>
+                <a:cs typeface="Calibri" panose="020F0502020204030204" pitchFamily="34" charset="0"/>
+              </a:rPr>
+              <a:t>choose {0,1} </a:t>
+            </a:r>
+            <a:r>
+              <a:rPr lang="en-US" sz="2400" dirty="0">
+                <a:solidFill>
+                  <a:srgbClr val="00B0F0"/>
+                </a:solidFill>
+                <a:latin typeface="Calibri" panose="020F0502020204030204" pitchFamily="34" charset="0"/>
+                <a:cs typeface="Calibri" panose="020F0502020204030204" pitchFamily="34" charset="0"/>
+              </a:rPr>
+              <a:t>as the added label.</a:t>
+            </a:r>
+          </a:p>
+          <a:p>
+            <a:pPr lvl="1"/>
+            <a:r>
+              <a:rPr lang="en-US" sz="2400" dirty="0">
+                <a:solidFill>
+                  <a:srgbClr val="FFFF00"/>
+                </a:solidFill>
+                <a:latin typeface="Calibri" panose="020F0502020204030204" pitchFamily="34" charset="0"/>
+                <a:cs typeface="Calibri" panose="020F0502020204030204" pitchFamily="34" charset="0"/>
+              </a:rPr>
+              <a:t>Before </a:t>
+            </a:r>
+            <a:r>
+              <a:rPr lang="en-US" sz="2400" dirty="0" err="1">
+                <a:solidFill>
+                  <a:srgbClr val="FFFF00"/>
+                </a:solidFill>
+                <a:latin typeface="Calibri" panose="020F0502020204030204" pitchFamily="34" charset="0"/>
+                <a:cs typeface="Calibri" panose="020F0502020204030204" pitchFamily="34" charset="0"/>
+              </a:rPr>
+              <a:t>depad</a:t>
+            </a:r>
+            <a:r>
+              <a:rPr lang="en-US" sz="2400" dirty="0">
+                <a:solidFill>
+                  <a:srgbClr val="FFFF00"/>
+                </a:solidFill>
+                <a:latin typeface="Calibri" panose="020F0502020204030204" pitchFamily="34" charset="0"/>
+                <a:cs typeface="Calibri" panose="020F0502020204030204" pitchFamily="34" charset="0"/>
+              </a:rPr>
+              <a:t>: I like Boston00000000000</a:t>
+            </a:r>
+          </a:p>
+          <a:p>
+            <a:pPr lvl="1"/>
+            <a:r>
+              <a:rPr lang="en-US" sz="2400" dirty="0">
+                <a:solidFill>
+                  <a:srgbClr val="FFFF00"/>
+                </a:solidFill>
+                <a:latin typeface="Calibri" panose="020F0502020204030204" pitchFamily="34" charset="0"/>
+                <a:cs typeface="Calibri" panose="020F0502020204030204" pitchFamily="34" charset="0"/>
+              </a:rPr>
+              <a:t>After </a:t>
+            </a:r>
+            <a:r>
+              <a:rPr lang="en-US" sz="2400" dirty="0" err="1">
+                <a:solidFill>
+                  <a:srgbClr val="FFFF00"/>
+                </a:solidFill>
+                <a:latin typeface="Calibri" panose="020F0502020204030204" pitchFamily="34" charset="0"/>
+                <a:cs typeface="Calibri" panose="020F0502020204030204" pitchFamily="34" charset="0"/>
+              </a:rPr>
+              <a:t>depad</a:t>
+            </a:r>
+            <a:r>
+              <a:rPr lang="en-US" sz="2400" dirty="0">
+                <a:solidFill>
+                  <a:srgbClr val="FFFF00"/>
+                </a:solidFill>
+                <a:latin typeface="Calibri" panose="020F0502020204030204" pitchFamily="34" charset="0"/>
+                <a:cs typeface="Calibri" panose="020F0502020204030204" pitchFamily="34" charset="0"/>
+              </a:rPr>
+              <a:t>: </a:t>
+            </a:r>
+            <a:r>
+              <a:rPr lang="en-US" altLang="zh-CN" sz="2400" dirty="0">
+                <a:solidFill>
+                  <a:srgbClr val="FFFF00"/>
+                </a:solidFill>
+                <a:latin typeface="Calibri" panose="020F0502020204030204" pitchFamily="34" charset="0"/>
+                <a:cs typeface="Calibri" panose="020F0502020204030204" pitchFamily="34" charset="0"/>
+              </a:rPr>
+              <a:t>I like Boston</a:t>
+            </a:r>
+            <a:endParaRPr lang="en-US" sz="2400" dirty="0">
+              <a:solidFill>
+                <a:srgbClr val="FFFF00"/>
+              </a:solidFill>
+              <a:latin typeface="Calibri" panose="020F0502020204030204" pitchFamily="34" charset="0"/>
+              <a:cs typeface="Calibri" panose="020F0502020204030204" pitchFamily="34" charset="0"/>
+            </a:endParaRPr>
+          </a:p>
+        </p:txBody>
+      </p:sp>
+    </p:spTree>
+    <p:extLst>
+      <p:ext uri="{BB962C8B-B14F-4D97-AF65-F5344CB8AC3E}">
+        <p14:creationId xmlns:p14="http://schemas.microsoft.com/office/powerpoint/2010/main" val="3615012674"/>
+      </p:ext>
+    </p:extLst>
+  </p:cSld>
+  <p:clrMapOvr>
+    <a:masterClrMapping/>
+  </p:clrMapOvr>
+</p:sld>
+</file>
+
+<file path=ppt/slides/slide5.xml><?xml version="1.0" encoding="utf-8"?>
+<p:sld xmlns:a="http://schemas.openxmlformats.org/drawingml/2006/main" xmlns:r="http://schemas.openxmlformats.org/officeDocument/2006/relationships" xmlns:p="http://schemas.openxmlformats.org/presentationml/2006/main">
+  <p:cSld>
+    <p:spTree>
+      <p:nvGrpSpPr>
+        <p:cNvPr id="1" name=""/>
+        <p:cNvGrpSpPr/>
+        <p:nvPr/>
+      </p:nvGrpSpPr>
+      <p:grpSpPr>
+        <a:xfrm>
+          <a:off x="0" y="0"/>
+          <a:ext cx="0" cy="0"/>
+          <a:chOff x="0" y="0"/>
+          <a:chExt cx="0" cy="0"/>
+        </a:xfrm>
+      </p:grpSpPr>
+      <p:sp>
+        <p:nvSpPr>
+          <p:cNvPr id="3" name="内容占位符 2">
+            <a:extLst>
+              <a:ext uri="{FF2B5EF4-FFF2-40B4-BE49-F238E27FC236}">
+                <a16:creationId xmlns:a16="http://schemas.microsoft.com/office/drawing/2014/main" id="{C0F5322C-F5FD-41D3-B17C-EF8CFF58CE74}"/>
+              </a:ext>
+            </a:extLst>
+          </p:cNvPr>
+          <p:cNvSpPr>
+            <a:spLocks noGrp="1"/>
+          </p:cNvSpPr>
+          <p:nvPr>
+            <p:ph idx="1"/>
+          </p:nvPr>
+        </p:nvSpPr>
+        <p:spPr>
+          <a:xfrm>
+            <a:off x="685800" y="484094"/>
+            <a:ext cx="10820400" cy="6060141"/>
+          </a:xfrm>
+        </p:spPr>
+        <p:txBody>
+          <a:bodyPr>
+            <a:normAutofit/>
+          </a:bodyPr>
+          <a:lstStyle/>
+          <a:p>
+            <a:r>
+              <a:rPr lang="en-US" sz="3600" dirty="0">
+                <a:latin typeface="Calibri" panose="020F0502020204030204" pitchFamily="34" charset="0"/>
+                <a:cs typeface="Calibri" panose="020F0502020204030204" pitchFamily="34" charset="0"/>
+              </a:rPr>
+              <a:t>Function Outlines</a:t>
+            </a:r>
+          </a:p>
+          <a:p>
+            <a:r>
+              <a:rPr lang="en-US" sz="2800" dirty="0">
+                <a:latin typeface="Calibri" panose="020F0502020204030204" pitchFamily="34" charset="0"/>
+                <a:cs typeface="Calibri" panose="020F0502020204030204" pitchFamily="34" charset="0"/>
+              </a:rPr>
+              <a:t>File Loading</a:t>
+            </a:r>
+          </a:p>
+          <a:p>
+            <a:pPr lvl="1"/>
+            <a:r>
+              <a:rPr lang="en-US" sz="2400" dirty="0">
+                <a:latin typeface="Calibri" panose="020F0502020204030204" pitchFamily="34" charset="0"/>
+                <a:cs typeface="Calibri" panose="020F0502020204030204" pitchFamily="34" charset="0"/>
+              </a:rPr>
+              <a:t>Generate a new filename structure, initialize name and insert into filename dictionary.</a:t>
+            </a:r>
+          </a:p>
+          <a:p>
+            <a:pPr lvl="1"/>
+            <a:r>
+              <a:rPr lang="en-US" sz="2400" dirty="0">
+                <a:latin typeface="Calibri" panose="020F0502020204030204" pitchFamily="34" charset="0"/>
+                <a:cs typeface="Calibri" panose="020F0502020204030204" pitchFamily="34" charset="0"/>
+              </a:rPr>
+              <a:t>Splitting file into chunks.</a:t>
+            </a:r>
+          </a:p>
+          <a:p>
+            <a:pPr lvl="1"/>
+            <a:r>
+              <a:rPr lang="en-US" sz="2400" dirty="0">
+                <a:latin typeface="Calibri" panose="020F0502020204030204" pitchFamily="34" charset="0"/>
+                <a:cs typeface="Calibri" panose="020F0502020204030204" pitchFamily="34" charset="0"/>
+              </a:rPr>
+              <a:t>For each chunk, do a SHA256 hash and search for same entry in </a:t>
+            </a:r>
+            <a:r>
+              <a:rPr lang="en-US" sz="2400" dirty="0" err="1">
+                <a:latin typeface="Calibri" panose="020F0502020204030204" pitchFamily="34" charset="0"/>
+                <a:cs typeface="Calibri" panose="020F0502020204030204" pitchFamily="34" charset="0"/>
+              </a:rPr>
+              <a:t>chunkname</a:t>
+            </a:r>
+            <a:r>
+              <a:rPr lang="en-US" sz="2400" dirty="0">
+                <a:latin typeface="Calibri" panose="020F0502020204030204" pitchFamily="34" charset="0"/>
+                <a:cs typeface="Calibri" panose="020F0502020204030204" pitchFamily="34" charset="0"/>
+              </a:rPr>
+              <a:t> dictionary. If found, simply add its </a:t>
+            </a:r>
+            <a:r>
+              <a:rPr lang="en-US" sz="2400" dirty="0" err="1">
+                <a:latin typeface="Calibri" panose="020F0502020204030204" pitchFamily="34" charset="0"/>
+                <a:cs typeface="Calibri" panose="020F0502020204030204" pitchFamily="34" charset="0"/>
+              </a:rPr>
+              <a:t>ownercount</a:t>
+            </a:r>
+            <a:r>
+              <a:rPr lang="en-US" sz="2400" dirty="0">
+                <a:latin typeface="Calibri" panose="020F0502020204030204" pitchFamily="34" charset="0"/>
+                <a:cs typeface="Calibri" panose="020F0502020204030204" pitchFamily="34" charset="0"/>
+              </a:rPr>
+              <a:t> by 1; else, save the actual data segment using the hash as name. A new Chunk structure is also built w/ </a:t>
+            </a:r>
+            <a:r>
+              <a:rPr lang="en-US" sz="2400" dirty="0" err="1">
+                <a:latin typeface="Calibri" panose="020F0502020204030204" pitchFamily="34" charset="0"/>
+                <a:cs typeface="Calibri" panose="020F0502020204030204" pitchFamily="34" charset="0"/>
+              </a:rPr>
+              <a:t>chunkname</a:t>
+            </a:r>
+            <a:r>
+              <a:rPr lang="en-US" sz="2400" dirty="0">
+                <a:latin typeface="Calibri" panose="020F0502020204030204" pitchFamily="34" charset="0"/>
+                <a:cs typeface="Calibri" panose="020F0502020204030204" pitchFamily="34" charset="0"/>
+              </a:rPr>
+              <a:t> and link the previous one to the current Chunk.</a:t>
+            </a:r>
+          </a:p>
+          <a:p>
+            <a:pPr lvl="1"/>
+            <a:r>
+              <a:rPr lang="en-US" sz="2400" dirty="0">
+                <a:latin typeface="Calibri" panose="020F0502020204030204" pitchFamily="34" charset="0"/>
+                <a:cs typeface="Calibri" panose="020F0502020204030204" pitchFamily="34" charset="0"/>
+              </a:rPr>
+              <a:t>Judge if the last segment need padding and pad it and set </a:t>
+            </a:r>
+            <a:r>
+              <a:rPr lang="en-US" sz="2400" i="1" dirty="0">
+                <a:latin typeface="Calibri" panose="020F0502020204030204" pitchFamily="34" charset="0"/>
+                <a:cs typeface="Calibri" panose="020F0502020204030204" pitchFamily="34" charset="0"/>
+              </a:rPr>
+              <a:t>padded</a:t>
+            </a:r>
+            <a:r>
+              <a:rPr lang="en-US" sz="2400" dirty="0">
+                <a:latin typeface="Calibri" panose="020F0502020204030204" pitchFamily="34" charset="0"/>
+                <a:cs typeface="Calibri" panose="020F0502020204030204" pitchFamily="34" charset="0"/>
+              </a:rPr>
+              <a:t>=1 if true. Then hash and build Chunk same as above.</a:t>
+            </a:r>
+          </a:p>
+          <a:p>
+            <a:r>
+              <a:rPr lang="en-US" sz="2800" dirty="0">
+                <a:latin typeface="Calibri" panose="020F0502020204030204" pitchFamily="34" charset="0"/>
+                <a:cs typeface="Calibri" panose="020F0502020204030204" pitchFamily="34" charset="0"/>
+              </a:rPr>
+              <a:t>File Listing</a:t>
+            </a:r>
+          </a:p>
+          <a:p>
+            <a:pPr lvl="1"/>
+            <a:r>
+              <a:rPr lang="en-US" sz="2400" dirty="0">
+                <a:latin typeface="Calibri" panose="020F0502020204030204" pitchFamily="34" charset="0"/>
+                <a:cs typeface="Calibri" panose="020F0502020204030204" pitchFamily="34" charset="0"/>
+              </a:rPr>
+              <a:t>Just list the dictionary of filenames. Supports alphabetical order; with extra timestamp/file size it is possible to have these orders as well.</a:t>
+            </a:r>
+          </a:p>
+        </p:txBody>
+      </p:sp>
+    </p:spTree>
+    <p:extLst>
+      <p:ext uri="{BB962C8B-B14F-4D97-AF65-F5344CB8AC3E}">
+        <p14:creationId xmlns:p14="http://schemas.microsoft.com/office/powerpoint/2010/main" val="1136102002"/>
+      </p:ext>
+    </p:extLst>
+  </p:cSld>
+  <p:clrMapOvr>
+    <a:masterClrMapping/>
+  </p:clrMapOvr>
+</p:sld>
+</file>
+
+<file path=ppt/slides/slide6.xml><?xml version="1.0" encoding="utf-8"?>
+<p:sld xmlns:a="http://schemas.openxmlformats.org/drawingml/2006/main" xmlns:r="http://schemas.openxmlformats.org/officeDocument/2006/relationships" xmlns:p="http://schemas.openxmlformats.org/presentationml/2006/main">
+  <p:cSld>
+    <p:spTree>
+      <p:nvGrpSpPr>
+        <p:cNvPr id="1" name=""/>
+        <p:cNvGrpSpPr/>
+        <p:nvPr/>
+      </p:nvGrpSpPr>
+      <p:grpSpPr>
+        <a:xfrm>
+          <a:off x="0" y="0"/>
+          <a:ext cx="0" cy="0"/>
+          <a:chOff x="0" y="0"/>
+          <a:chExt cx="0" cy="0"/>
+        </a:xfrm>
+      </p:grpSpPr>
+      <p:sp>
+        <p:nvSpPr>
+          <p:cNvPr id="3" name="内容占位符 2">
+            <a:extLst>
+              <a:ext uri="{FF2B5EF4-FFF2-40B4-BE49-F238E27FC236}">
+                <a16:creationId xmlns:a16="http://schemas.microsoft.com/office/drawing/2014/main" id="{C0F5322C-F5FD-41D3-B17C-EF8CFF58CE74}"/>
+              </a:ext>
+            </a:extLst>
+          </p:cNvPr>
+          <p:cNvSpPr>
+            <a:spLocks noGrp="1"/>
+          </p:cNvSpPr>
+          <p:nvPr>
+            <p:ph idx="1"/>
+          </p:nvPr>
+        </p:nvSpPr>
+        <p:spPr>
+          <a:xfrm>
             <a:off x="685800" y="555812"/>
             <a:ext cx="10820400" cy="6382871"/>
           </a:xfrm>
@@ -6663,7 +7107,7 @@
 </p:sld>
 </file>
 
-<file path=ppt/slides/slide5.xml><?xml version="1.0" encoding="utf-8"?>
+<file path=ppt/slides/slide7.xml><?xml version="1.0" encoding="utf-8"?>
 <p:sld xmlns:a="http://schemas.openxmlformats.org/drawingml/2006/main" xmlns:r="http://schemas.openxmlformats.org/officeDocument/2006/relationships" xmlns:p="http://schemas.openxmlformats.org/presentationml/2006/main">
   <p:cSld>
     <p:spTree>

</xml_diff>